<commit_message>
Embed fonts the in the sim-flowchart.pdf and regenerate it
</commit_message>
<xml_diff>
--- a/images/sim_flowchart.pptx
+++ b/images/sim_flowchart.pptx
@@ -1,6 +1,6 @@
 
 <file path=ppt/presentation.xml><?xml version="1.0" encoding="utf-8"?>
-<p:presentation xmlns:a="http://schemas.openxmlformats.org/drawingml/2006/main" xmlns:r="http://schemas.openxmlformats.org/officeDocument/2006/relationships" xmlns:p="http://schemas.openxmlformats.org/presentationml/2006/main" saveSubsetFonts="1" autoCompressPictures="0">
+<p:presentation xmlns:a="http://schemas.openxmlformats.org/drawingml/2006/main" xmlns:r="http://schemas.openxmlformats.org/officeDocument/2006/relationships" xmlns:p="http://schemas.openxmlformats.org/presentationml/2006/main" embedTrueTypeFonts="1" saveSubsetFonts="1" autoCompressPictures="0">
   <p:sldMasterIdLst>
     <p:sldMasterId id="2147483696" r:id="rId1"/>
   </p:sldMasterIdLst>
@@ -12,6 +12,20 @@
   </p:sldIdLst>
   <p:sldSz cx="7974013" cy="8934450"/>
   <p:notesSz cx="6858000" cy="9144000"/>
+  <p:embeddedFontLst>
+    <p:embeddedFont>
+      <p:font typeface="Calibri" panose="020F0502020204030204" pitchFamily="34" charset="0"/>
+      <p:regular r:id="rId4"/>
+      <p:bold r:id="rId5"/>
+      <p:italic r:id="rId6"/>
+      <p:boldItalic r:id="rId7"/>
+    </p:embeddedFont>
+    <p:embeddedFont>
+      <p:font typeface="Calibri Light" panose="020F0302020204030204" pitchFamily="34" charset="0"/>
+      <p:regular r:id="rId8"/>
+      <p:italic r:id="rId9"/>
+    </p:embeddedFont>
+  </p:embeddedFontLst>
   <p:defaultTextStyle>
     <a:defPPr>
       <a:defRPr lang="en-US"/>
@@ -197,7 +211,7 @@
           <a:p>
             <a:fld id="{682C156E-B2ED-5545-B3E1-C10C252EB8CF}" type="datetimeFigureOut">
               <a:rPr lang="en-GB" smtClean="0"/>
-              <a:t>13/11/2021</a:t>
+              <a:t>14/03/2022</a:t>
             </a:fld>
             <a:endParaRPr lang="en-GB"/>
           </a:p>
@@ -684,7 +698,7 @@
           <a:p>
             <a:fld id="{EBD3ECF6-01E3-B548-A9A7-C44848EDAEF7}" type="datetimeFigureOut">
               <a:rPr lang="en-GB" smtClean="0"/>
-              <a:t>13/11/2021</a:t>
+              <a:t>14/03/2022</a:t>
             </a:fld>
             <a:endParaRPr lang="en-GB"/>
           </a:p>
@@ -854,7 +868,7 @@
           <a:p>
             <a:fld id="{EBD3ECF6-01E3-B548-A9A7-C44848EDAEF7}" type="datetimeFigureOut">
               <a:rPr lang="en-GB" smtClean="0"/>
-              <a:t>13/11/2021</a:t>
+              <a:t>14/03/2022</a:t>
             </a:fld>
             <a:endParaRPr lang="en-GB"/>
           </a:p>
@@ -1034,7 +1048,7 @@
           <a:p>
             <a:fld id="{EBD3ECF6-01E3-B548-A9A7-C44848EDAEF7}" type="datetimeFigureOut">
               <a:rPr lang="en-GB" smtClean="0"/>
-              <a:t>13/11/2021</a:t>
+              <a:t>14/03/2022</a:t>
             </a:fld>
             <a:endParaRPr lang="en-GB"/>
           </a:p>
@@ -1204,7 +1218,7 @@
           <a:p>
             <a:fld id="{EBD3ECF6-01E3-B548-A9A7-C44848EDAEF7}" type="datetimeFigureOut">
               <a:rPr lang="en-GB" smtClean="0"/>
-              <a:t>13/11/2021</a:t>
+              <a:t>14/03/2022</a:t>
             </a:fld>
             <a:endParaRPr lang="en-GB"/>
           </a:p>
@@ -1448,7 +1462,7 @@
           <a:p>
             <a:fld id="{EBD3ECF6-01E3-B548-A9A7-C44848EDAEF7}" type="datetimeFigureOut">
               <a:rPr lang="en-GB" smtClean="0"/>
-              <a:t>13/11/2021</a:t>
+              <a:t>14/03/2022</a:t>
             </a:fld>
             <a:endParaRPr lang="en-GB"/>
           </a:p>
@@ -1680,7 +1694,7 @@
           <a:p>
             <a:fld id="{EBD3ECF6-01E3-B548-A9A7-C44848EDAEF7}" type="datetimeFigureOut">
               <a:rPr lang="en-GB" smtClean="0"/>
-              <a:t>13/11/2021</a:t>
+              <a:t>14/03/2022</a:t>
             </a:fld>
             <a:endParaRPr lang="en-GB"/>
           </a:p>
@@ -2047,7 +2061,7 @@
           <a:p>
             <a:fld id="{EBD3ECF6-01E3-B548-A9A7-C44848EDAEF7}" type="datetimeFigureOut">
               <a:rPr lang="en-GB" smtClean="0"/>
-              <a:t>13/11/2021</a:t>
+              <a:t>14/03/2022</a:t>
             </a:fld>
             <a:endParaRPr lang="en-GB"/>
           </a:p>
@@ -2165,7 +2179,7 @@
           <a:p>
             <a:fld id="{EBD3ECF6-01E3-B548-A9A7-C44848EDAEF7}" type="datetimeFigureOut">
               <a:rPr lang="en-GB" smtClean="0"/>
-              <a:t>13/11/2021</a:t>
+              <a:t>14/03/2022</a:t>
             </a:fld>
             <a:endParaRPr lang="en-GB"/>
           </a:p>
@@ -2260,7 +2274,7 @@
           <a:p>
             <a:fld id="{EBD3ECF6-01E3-B548-A9A7-C44848EDAEF7}" type="datetimeFigureOut">
               <a:rPr lang="en-GB" smtClean="0"/>
-              <a:t>13/11/2021</a:t>
+              <a:t>14/03/2022</a:t>
             </a:fld>
             <a:endParaRPr lang="en-GB"/>
           </a:p>
@@ -2537,7 +2551,7 @@
           <a:p>
             <a:fld id="{EBD3ECF6-01E3-B548-A9A7-C44848EDAEF7}" type="datetimeFigureOut">
               <a:rPr lang="en-GB" smtClean="0"/>
-              <a:t>13/11/2021</a:t>
+              <a:t>14/03/2022</a:t>
             </a:fld>
             <a:endParaRPr lang="en-GB"/>
           </a:p>
@@ -2794,7 +2808,7 @@
           <a:p>
             <a:fld id="{EBD3ECF6-01E3-B548-A9A7-C44848EDAEF7}" type="datetimeFigureOut">
               <a:rPr lang="en-GB" smtClean="0"/>
-              <a:t>13/11/2021</a:t>
+              <a:t>14/03/2022</a:t>
             </a:fld>
             <a:endParaRPr lang="en-GB"/>
           </a:p>
@@ -3007,7 +3021,7 @@
           <a:p>
             <a:fld id="{EBD3ECF6-01E3-B548-A9A7-C44848EDAEF7}" type="datetimeFigureOut">
               <a:rPr lang="en-GB" smtClean="0"/>
-              <a:t>13/11/2021</a:t>
+              <a:t>14/03/2022</a:t>
             </a:fld>
             <a:endParaRPr lang="en-GB"/>
           </a:p>

</xml_diff>